<commit_message>
converted ppt to pdf
</commit_message>
<xml_diff>
--- a/ppt/Portfolio-PPT.pptx
+++ b/ppt/Portfolio-PPT.pptx
@@ -7158,9 +7158,12 @@
               <a:buNone/>
             </a:pPr>
             <a:r>
-              <a:rPr lang="en-AU" dirty="0"/>
+              <a:rPr lang="en-AU" dirty="0">
+                <a:hlinkClick r:id="rId2"/>
+              </a:rPr>
               <a:t>https://grey-joyner.netlify.app/</a:t>
             </a:r>
+            <a:endParaRPr lang="en-AU" dirty="0"/>
           </a:p>
         </p:txBody>
       </p:sp>
@@ -7179,7 +7182,7 @@
           <p:nvPr/>
         </p:nvPicPr>
         <p:blipFill>
-          <a:blip r:embed="rId2"/>
+          <a:blip r:embed="rId3"/>
           <a:stretch>
             <a:fillRect/>
           </a:stretch>
@@ -8518,21 +8521,21 @@
 </file>
 
 <file path=customXml/item1.xml><?xml version="1.0" encoding="utf-8"?>
+<?mso-contentType ?>
+<FormTemplates xmlns="http://schemas.microsoft.com/sharepoint/v3/contenttype/forms">
+  <Display>DocumentLibraryForm</Display>
+  <Edit>DocumentLibraryForm</Edit>
+  <New>DocumentLibraryForm</New>
+</FormTemplates>
+</file>
+
+<file path=customXml/item2.xml><?xml version="1.0" encoding="utf-8"?>
 <p:properties xmlns:p="http://schemas.microsoft.com/office/2006/metadata/properties" xmlns:xsi="http://www.w3.org/2001/XMLSchema-instance" xmlns:pc="http://schemas.microsoft.com/office/infopath/2007/PartnerControls">
   <documentManagement>
     <Status xmlns="71af3243-3dd4-4a8d-8c0d-dd76da1f02a5">Not started</Status>
     <MediaServiceKeyPoints xmlns="71af3243-3dd4-4a8d-8c0d-dd76da1f02a5" xsi:nil="true"/>
   </documentManagement>
 </p:properties>
-</file>
-
-<file path=customXml/item2.xml><?xml version="1.0" encoding="utf-8"?>
-<?mso-contentType ?>
-<FormTemplates xmlns="http://schemas.microsoft.com/sharepoint/v3/contenttype/forms">
-  <Display>DocumentLibraryForm</Display>
-  <Edit>DocumentLibraryForm</Edit>
-  <New>DocumentLibraryForm</New>
-</FormTemplates>
 </file>
 
 <file path=customXml/item3.xml><?xml version="1.0" encoding="utf-8"?>
@@ -8757,19 +8760,19 @@
 </file>
 
 <file path=customXml/itemProps1.xml><?xml version="1.0" encoding="utf-8"?>
+<ds:datastoreItem xmlns:ds="http://schemas.openxmlformats.org/officeDocument/2006/customXml" ds:itemID="{CDB58277-F8DF-46FF-84EC-EF41B835E69F}">
+  <ds:schemaRefs>
+    <ds:schemaRef ds:uri="http://schemas.microsoft.com/sharepoint/v3/contenttype/forms"/>
+  </ds:schemaRefs>
+</ds:datastoreItem>
+</file>
+
+<file path=customXml/itemProps2.xml><?xml version="1.0" encoding="utf-8"?>
 <ds:datastoreItem xmlns:ds="http://schemas.openxmlformats.org/officeDocument/2006/customXml" ds:itemID="{137651BA-F45C-4845-9AB3-E0A65B39F5E1}">
   <ds:schemaRefs>
     <ds:schemaRef ds:uri="http://schemas.microsoft.com/office/2006/metadata/properties"/>
     <ds:schemaRef ds:uri="http://schemas.microsoft.com/office/infopath/2007/PartnerControls"/>
     <ds:schemaRef ds:uri="71af3243-3dd4-4a8d-8c0d-dd76da1f02a5"/>
-  </ds:schemaRefs>
-</ds:datastoreItem>
-</file>
-
-<file path=customXml/itemProps2.xml><?xml version="1.0" encoding="utf-8"?>
-<ds:datastoreItem xmlns:ds="http://schemas.openxmlformats.org/officeDocument/2006/customXml" ds:itemID="{CDB58277-F8DF-46FF-84EC-EF41B835E69F}">
-  <ds:schemaRefs>
-    <ds:schemaRef ds:uri="http://schemas.microsoft.com/sharepoint/v3/contenttype/forms"/>
   </ds:schemaRefs>
 </ds:datastoreItem>
 </file>

</xml_diff>